<commit_message>
Funktionen und Übung zu Vektor hinzugefügt
</commit_message>
<xml_diff>
--- a/Einführung in R.pptx
+++ b/Einführung in R.pptx
@@ -15,9 +15,10 @@
     <p:sldId id="258" r:id="rId9"/>
     <p:sldId id="260" r:id="rId10"/>
     <p:sldId id="261" r:id="rId11"/>
-    <p:sldId id="262" r:id="rId12"/>
-    <p:sldId id="263" r:id="rId13"/>
-    <p:sldId id="265" r:id="rId14"/>
+    <p:sldId id="269" r:id="rId12"/>
+    <p:sldId id="262" r:id="rId13"/>
+    <p:sldId id="263" r:id="rId14"/>
+    <p:sldId id="265" r:id="rId15"/>
   </p:sldIdLst>
   <p:sldSz cx="12192000" cy="6858000"/>
   <p:notesSz cx="6858000" cy="9144000"/>
@@ -271,7 +272,7 @@
           <a:p>
             <a:fld id="{3F46AE61-50B3-4440-BB01-1FF85E3E82A7}" type="datetimeFigureOut">
               <a:rPr lang="de-DE" smtClean="0"/>
-              <a:t>26.09.2024</a:t>
+              <a:t>27.09.2024</a:t>
             </a:fld>
             <a:endParaRPr lang="de-DE"/>
           </a:p>
@@ -469,7 +470,7 @@
           <a:p>
             <a:fld id="{3F46AE61-50B3-4440-BB01-1FF85E3E82A7}" type="datetimeFigureOut">
               <a:rPr lang="de-DE" smtClean="0"/>
-              <a:t>26.09.2024</a:t>
+              <a:t>27.09.2024</a:t>
             </a:fld>
             <a:endParaRPr lang="de-DE"/>
           </a:p>
@@ -677,7 +678,7 @@
           <a:p>
             <a:fld id="{3F46AE61-50B3-4440-BB01-1FF85E3E82A7}" type="datetimeFigureOut">
               <a:rPr lang="de-DE" smtClean="0"/>
-              <a:t>26.09.2024</a:t>
+              <a:t>27.09.2024</a:t>
             </a:fld>
             <a:endParaRPr lang="de-DE"/>
           </a:p>
@@ -875,7 +876,7 @@
           <a:p>
             <a:fld id="{3F46AE61-50B3-4440-BB01-1FF85E3E82A7}" type="datetimeFigureOut">
               <a:rPr lang="de-DE" smtClean="0"/>
-              <a:t>26.09.2024</a:t>
+              <a:t>27.09.2024</a:t>
             </a:fld>
             <a:endParaRPr lang="de-DE"/>
           </a:p>
@@ -1150,7 +1151,7 @@
           <a:p>
             <a:fld id="{3F46AE61-50B3-4440-BB01-1FF85E3E82A7}" type="datetimeFigureOut">
               <a:rPr lang="de-DE" smtClean="0"/>
-              <a:t>26.09.2024</a:t>
+              <a:t>27.09.2024</a:t>
             </a:fld>
             <a:endParaRPr lang="de-DE"/>
           </a:p>
@@ -1415,7 +1416,7 @@
           <a:p>
             <a:fld id="{3F46AE61-50B3-4440-BB01-1FF85E3E82A7}" type="datetimeFigureOut">
               <a:rPr lang="de-DE" smtClean="0"/>
-              <a:t>26.09.2024</a:t>
+              <a:t>27.09.2024</a:t>
             </a:fld>
             <a:endParaRPr lang="de-DE"/>
           </a:p>
@@ -1827,7 +1828,7 @@
           <a:p>
             <a:fld id="{3F46AE61-50B3-4440-BB01-1FF85E3E82A7}" type="datetimeFigureOut">
               <a:rPr lang="de-DE" smtClean="0"/>
-              <a:t>26.09.2024</a:t>
+              <a:t>27.09.2024</a:t>
             </a:fld>
             <a:endParaRPr lang="de-DE"/>
           </a:p>
@@ -1968,7 +1969,7 @@
           <a:p>
             <a:fld id="{3F46AE61-50B3-4440-BB01-1FF85E3E82A7}" type="datetimeFigureOut">
               <a:rPr lang="de-DE" smtClean="0"/>
-              <a:t>26.09.2024</a:t>
+              <a:t>27.09.2024</a:t>
             </a:fld>
             <a:endParaRPr lang="de-DE"/>
           </a:p>
@@ -2081,7 +2082,7 @@
           <a:p>
             <a:fld id="{3F46AE61-50B3-4440-BB01-1FF85E3E82A7}" type="datetimeFigureOut">
               <a:rPr lang="de-DE" smtClean="0"/>
-              <a:t>26.09.2024</a:t>
+              <a:t>27.09.2024</a:t>
             </a:fld>
             <a:endParaRPr lang="de-DE"/>
           </a:p>
@@ -2392,7 +2393,7 @@
           <a:p>
             <a:fld id="{3F46AE61-50B3-4440-BB01-1FF85E3E82A7}" type="datetimeFigureOut">
               <a:rPr lang="de-DE" smtClean="0"/>
-              <a:t>26.09.2024</a:t>
+              <a:t>27.09.2024</a:t>
             </a:fld>
             <a:endParaRPr lang="de-DE"/>
           </a:p>
@@ -2680,7 +2681,7 @@
           <a:p>
             <a:fld id="{3F46AE61-50B3-4440-BB01-1FF85E3E82A7}" type="datetimeFigureOut">
               <a:rPr lang="de-DE" smtClean="0"/>
-              <a:t>26.09.2024</a:t>
+              <a:t>27.09.2024</a:t>
             </a:fld>
             <a:endParaRPr lang="de-DE"/>
           </a:p>
@@ -2921,7 +2922,7 @@
           <a:p>
             <a:fld id="{3F46AE61-50B3-4440-BB01-1FF85E3E82A7}" type="datetimeFigureOut">
               <a:rPr lang="de-DE" smtClean="0"/>
-              <a:t>26.09.2024</a:t>
+              <a:t>27.09.2024</a:t>
             </a:fld>
             <a:endParaRPr lang="de-DE"/>
           </a:p>
@@ -3581,7 +3582,7 @@
           <p:cNvPr id="2" name="Titel 1">
             <a:extLst>
               <a:ext uri="{FF2B5EF4-FFF2-40B4-BE49-F238E27FC236}">
-                <a16:creationId xmlns:a16="http://schemas.microsoft.com/office/drawing/2014/main" id="{AC027F97-6EC1-4A37-B082-BDDE5E5BAF69}"/>
+                <a16:creationId xmlns:a16="http://schemas.microsoft.com/office/drawing/2014/main" id="{0E150637-28B9-41D3-8696-7FEB4DFA0671}"/>
               </a:ext>
             </a:extLst>
           </p:cNvPr>
@@ -3599,7 +3600,7 @@
           <a:p>
             <a:r>
               <a:rPr lang="de-DE" dirty="0"/>
-              <a:t>Matrizen</a:t>
+              <a:t>Funktionen</a:t>
             </a:r>
           </a:p>
         </p:txBody>
@@ -3609,7 +3610,7 @@
           <p:cNvPr id="3" name="Inhaltsplatzhalter 2">
             <a:extLst>
               <a:ext uri="{FF2B5EF4-FFF2-40B4-BE49-F238E27FC236}">
-                <a16:creationId xmlns:a16="http://schemas.microsoft.com/office/drawing/2014/main" id="{7150AA3E-74DA-400E-A9AE-32DE27C78691}"/>
+                <a16:creationId xmlns:a16="http://schemas.microsoft.com/office/drawing/2014/main" id="{438E3F8C-ED94-4360-876E-DB66036C02A9}"/>
               </a:ext>
             </a:extLst>
           </p:cNvPr>
@@ -3627,33 +3628,63 @@
           <a:p>
             <a:r>
               <a:rPr lang="de-DE" dirty="0"/>
-              <a:t>2 dimensionaler Vektor</a:t>
-            </a:r>
-          </a:p>
-          <a:p>
-            <a:r>
-              <a:rPr lang="de-DE" dirty="0"/>
-              <a:t>Bei Indizierung mit [] muss jetzt Zeile und Spalte angegeben werden</a:t>
-            </a:r>
-          </a:p>
-          <a:p>
-            <a:r>
-              <a:rPr lang="de-DE" dirty="0"/>
-              <a:t>Erste Zahl: Zeile</a:t>
-            </a:r>
-          </a:p>
-          <a:p>
-            <a:r>
-              <a:rPr lang="de-DE" dirty="0"/>
-              <a:t>Zweite Zahl: Spalte</a:t>
-            </a:r>
+              <a:t>Gekennzeichnet durch ( )</a:t>
+            </a:r>
+          </a:p>
+          <a:p>
+            <a:r>
+              <a:rPr lang="de-DE" dirty="0"/>
+              <a:t>Mit F1 Taste lässt sich die Hilfe Seite der Funktion öffnen</a:t>
+            </a:r>
+          </a:p>
+          <a:p>
+            <a:r>
+              <a:rPr lang="de-DE" dirty="0"/>
+              <a:t>Unbekannte Funktionen lassen sich per Hilfe-&gt;Suche finden</a:t>
+            </a:r>
+          </a:p>
+          <a:p>
+            <a:r>
+              <a:rPr lang="de-DE" dirty="0"/>
+              <a:t>Viele Funktionen sind nur in zusätzlichen Paketen enthalten</a:t>
+            </a:r>
+          </a:p>
+          <a:p>
+            <a:pPr lvl="1"/>
+            <a:r>
+              <a:rPr lang="de-DE" dirty="0"/>
+              <a:t>-&gt; Google </a:t>
+            </a:r>
+          </a:p>
+          <a:p>
+            <a:r>
+              <a:rPr lang="de-DE" dirty="0" err="1"/>
+              <a:t>install.packages</a:t>
+            </a:r>
+            <a:r>
+              <a:rPr lang="de-DE" dirty="0"/>
+              <a:t>(„Paketname“) installiert das Paket</a:t>
+            </a:r>
+          </a:p>
+          <a:p>
+            <a:r>
+              <a:rPr lang="de-DE" dirty="0" err="1"/>
+              <a:t>library</a:t>
+            </a:r>
+            <a:r>
+              <a:rPr lang="de-DE" dirty="0"/>
+              <a:t>(Paketname) oder Paketname:: machen Funktionen zugreifbar</a:t>
+            </a:r>
+          </a:p>
+          <a:p>
+            <a:endParaRPr lang="de-DE" dirty="0"/>
           </a:p>
         </p:txBody>
       </p:sp>
     </p:spTree>
     <p:extLst>
       <p:ext uri="{BB962C8B-B14F-4D97-AF65-F5344CB8AC3E}">
-        <p14:creationId xmlns:p14="http://schemas.microsoft.com/office/powerpoint/2010/main" val="2897851853"/>
+        <p14:creationId xmlns:p14="http://schemas.microsoft.com/office/powerpoint/2010/main" val="3779274688"/>
       </p:ext>
     </p:extLst>
   </p:cSld>
@@ -3685,6 +3716,110 @@
           <p:cNvPr id="2" name="Titel 1">
             <a:extLst>
               <a:ext uri="{FF2B5EF4-FFF2-40B4-BE49-F238E27FC236}">
+                <a16:creationId xmlns:a16="http://schemas.microsoft.com/office/drawing/2014/main" id="{AC027F97-6EC1-4A37-B082-BDDE5E5BAF69}"/>
+              </a:ext>
+            </a:extLst>
+          </p:cNvPr>
+          <p:cNvSpPr>
+            <a:spLocks noGrp="1"/>
+          </p:cNvSpPr>
+          <p:nvPr>
+            <p:ph type="title"/>
+          </p:nvPr>
+        </p:nvSpPr>
+        <p:spPr/>
+        <p:txBody>
+          <a:bodyPr/>
+          <a:lstStyle/>
+          <a:p>
+            <a:r>
+              <a:rPr lang="de-DE" dirty="0"/>
+              <a:t>Matrizen</a:t>
+            </a:r>
+          </a:p>
+        </p:txBody>
+      </p:sp>
+      <p:sp>
+        <p:nvSpPr>
+          <p:cNvPr id="3" name="Inhaltsplatzhalter 2">
+            <a:extLst>
+              <a:ext uri="{FF2B5EF4-FFF2-40B4-BE49-F238E27FC236}">
+                <a16:creationId xmlns:a16="http://schemas.microsoft.com/office/drawing/2014/main" id="{7150AA3E-74DA-400E-A9AE-32DE27C78691}"/>
+              </a:ext>
+            </a:extLst>
+          </p:cNvPr>
+          <p:cNvSpPr>
+            <a:spLocks noGrp="1"/>
+          </p:cNvSpPr>
+          <p:nvPr>
+            <p:ph idx="1"/>
+          </p:nvPr>
+        </p:nvSpPr>
+        <p:spPr/>
+        <p:txBody>
+          <a:bodyPr/>
+          <a:lstStyle/>
+          <a:p>
+            <a:r>
+              <a:rPr lang="de-DE" dirty="0"/>
+              <a:t>2 dimensionaler Vektor</a:t>
+            </a:r>
+          </a:p>
+          <a:p>
+            <a:r>
+              <a:rPr lang="de-DE" dirty="0"/>
+              <a:t>Bei Indizierung mit [] muss jetzt Zeile und Spalte angegeben werden</a:t>
+            </a:r>
+          </a:p>
+          <a:p>
+            <a:r>
+              <a:rPr lang="de-DE" dirty="0"/>
+              <a:t>Erste Zahl: Zeile</a:t>
+            </a:r>
+          </a:p>
+          <a:p>
+            <a:r>
+              <a:rPr lang="de-DE" dirty="0"/>
+              <a:t>Zweite Zahl: Spalte</a:t>
+            </a:r>
+          </a:p>
+        </p:txBody>
+      </p:sp>
+    </p:spTree>
+    <p:extLst>
+      <p:ext uri="{BB962C8B-B14F-4D97-AF65-F5344CB8AC3E}">
+        <p14:creationId xmlns:p14="http://schemas.microsoft.com/office/powerpoint/2010/main" val="2897851853"/>
+      </p:ext>
+    </p:extLst>
+  </p:cSld>
+  <p:clrMapOvr>
+    <a:masterClrMapping/>
+  </p:clrMapOvr>
+</p:sld>
+</file>
+
+<file path=ppt/slides/slide13.xml><?xml version="1.0" encoding="utf-8"?>
+<p:sld xmlns:a="http://schemas.openxmlformats.org/drawingml/2006/main" xmlns:r="http://schemas.openxmlformats.org/officeDocument/2006/relationships" xmlns:p="http://schemas.openxmlformats.org/presentationml/2006/main">
+  <p:cSld>
+    <p:spTree>
+      <p:nvGrpSpPr>
+        <p:cNvPr id="1" name=""/>
+        <p:cNvGrpSpPr/>
+        <p:nvPr/>
+      </p:nvGrpSpPr>
+      <p:grpSpPr>
+        <a:xfrm>
+          <a:off x="0" y="0"/>
+          <a:ext cx="0" cy="0"/>
+          <a:chOff x="0" y="0"/>
+          <a:chExt cx="0" cy="0"/>
+        </a:xfrm>
+      </p:grpSpPr>
+      <p:sp>
+        <p:nvSpPr>
+          <p:cNvPr id="2" name="Titel 1">
+            <a:extLst>
+              <a:ext uri="{FF2B5EF4-FFF2-40B4-BE49-F238E27FC236}">
                 <a16:creationId xmlns:a16="http://schemas.microsoft.com/office/drawing/2014/main" id="{9F03FD5D-0C57-4C4A-9C16-0AFCA3AC19A3}"/>
               </a:ext>
             </a:extLst>
@@ -3779,7 +3914,7 @@
 </p:sld>
 </file>
 
-<file path=ppt/slides/slide13.xml><?xml version="1.0" encoding="utf-8"?>
+<file path=ppt/slides/slide14.xml><?xml version="1.0" encoding="utf-8"?>
 <p:sld xmlns:a="http://schemas.openxmlformats.org/drawingml/2006/main" xmlns:r="http://schemas.openxmlformats.org/officeDocument/2006/relationships" xmlns:p="http://schemas.openxmlformats.org/presentationml/2006/main">
   <p:cSld>
     <p:spTree>

</xml_diff>